<commit_message>
Fixed the double apostrophe
</commit_message>
<xml_diff>
--- a/How to use Github with Netbeans.pptx
+++ b/How to use Github with Netbeans.pptx
@@ -5277,7 +5277,6 @@
               <a:rPr lang="en-US" altLang="x-none" dirty="0" smtClean="0"/>
               <a:t> repository do the following:</a:t>
             </a:r>
-            <a:endParaRPr lang="en-US" altLang="x-none" dirty="0" smtClean="0"/>
           </a:p>
           <a:p>
             <a:pPr marL="274320" lvl="1"/>
@@ -5297,7 +5296,6 @@
               <a:rPr lang="en-US" altLang="x-none" dirty="0" smtClean="0"/>
               <a:t>(eventually you wont even need to copy it, you can just type it)</a:t>
             </a:r>
-            <a:endParaRPr lang="en-US" altLang="x-none" dirty="0" smtClean="0"/>
           </a:p>
         </p:txBody>
       </p:sp>
@@ -5449,7 +5447,6 @@
               <a:rPr lang="en-US" altLang="x-none" dirty="0" smtClean="0"/>
               <a:t> info, and use the default branch (Master)</a:t>
             </a:r>
-            <a:endParaRPr lang="en-US" altLang="x-none" dirty="0" smtClean="0"/>
           </a:p>
         </p:txBody>
       </p:sp>
@@ -5714,15 +5711,19 @@
             </a:pPr>
             <a:r>
               <a:rPr lang="en-US" altLang="x-none" dirty="0" smtClean="0"/>
-              <a:t>No program doesn't</a:t>
-            </a:r>
-            <a:r>
-              <a:rPr lang="uk-UA" altLang="x-none" dirty="0" smtClean="0"/>
-              <a:t>’</a:t>
+              <a:t>No </a:t>
+            </a:r>
+            <a:r>
+              <a:rPr lang="en-US" altLang="x-none" smtClean="0"/>
+              <a:t>program </a:t>
+            </a:r>
+            <a:r>
+              <a:rPr lang="en-US" altLang="x-none" smtClean="0"/>
+              <a:t>doesn’t </a:t>
             </a:r>
             <a:r>
               <a:rPr lang="en-US" altLang="x-none" dirty="0" smtClean="0"/>
-              <a:t>t go without being changed over time and updating </a:t>
+              <a:t>go without being changed over time and updating </a:t>
             </a:r>
             <a:r>
               <a:rPr lang="en-US" altLang="x-none" dirty="0" err="1" smtClean="0"/>
@@ -5740,7 +5741,6 @@
               <a:rPr lang="en-US" altLang="x-none" dirty="0" smtClean="0"/>
               <a:t>Make some sort of changes to your program</a:t>
             </a:r>
-            <a:endParaRPr lang="en-US" altLang="x-none" dirty="0" smtClean="0"/>
           </a:p>
           <a:p>
             <a:pPr marL="274320" lvl="1"/>
@@ -5748,7 +5748,6 @@
               <a:rPr lang="en-US" altLang="x-none" dirty="0" smtClean="0"/>
               <a:t>This will add a great tag surrounding the lines that you have added (red indicated removed)</a:t>
             </a:r>
-            <a:endParaRPr lang="en-US" altLang="x-none" dirty="0" smtClean="0"/>
           </a:p>
           <a:p>
             <a:pPr marL="274320"/>
@@ -5896,7 +5895,6 @@
               <a:rPr lang="en-US" altLang="x-none" dirty="0" smtClean="0"/>
               <a:t>message</a:t>
             </a:r>
-            <a:endParaRPr lang="en-US" altLang="x-none" dirty="0" smtClean="0"/>
           </a:p>
           <a:p>
             <a:pPr marL="274320" lvl="1"/>
@@ -5912,7 +5910,6 @@
               <a:rPr lang="en-US" altLang="x-none" dirty="0" smtClean="0"/>
               <a:t>” “Remote” “Push” and do the same process as before</a:t>
             </a:r>
-            <a:endParaRPr lang="en-US" altLang="x-none" dirty="0" smtClean="0"/>
           </a:p>
           <a:p>
             <a:pPr marL="274320"/>
@@ -6083,17 +6080,12 @@
               <a:rPr lang="en-US" altLang="x-none" dirty="0" smtClean="0"/>
               <a:t> and refresh the page.</a:t>
             </a:r>
-            <a:endParaRPr lang="en-US" altLang="x-none" dirty="0" smtClean="0"/>
           </a:p>
           <a:p>
             <a:pPr marL="274320" lvl="1"/>
             <a:r>
               <a:rPr lang="en-US" altLang="x-none" dirty="0" smtClean="0"/>
-              <a:t>You wil</a:t>
-            </a:r>
-            <a:r>
-              <a:rPr lang="en-US" altLang="x-none" dirty="0" smtClean="0"/>
-              <a:t>l see that the /</a:t>
+              <a:t>You will see that the /</a:t>
             </a:r>
             <a:r>
               <a:rPr lang="en-US" altLang="x-none" dirty="0" err="1" smtClean="0"/>
@@ -6103,7 +6095,6 @@
               <a:rPr lang="en-US" altLang="x-none" dirty="0" smtClean="0"/>
               <a:t> folder had been updated with a new time stamp and the file itself has actually been updated</a:t>
             </a:r>
-            <a:endParaRPr lang="en-US" altLang="x-none" dirty="0" smtClean="0"/>
           </a:p>
           <a:p>
             <a:pPr marL="274320"/>
@@ -6676,7 +6667,6 @@
               <a:rPr lang="en-US" dirty="0" smtClean="0"/>
               <a:t>Name that program accordingly as it cant be changed later</a:t>
             </a:r>
-            <a:endParaRPr lang="en-US" dirty="0" smtClean="0"/>
           </a:p>
         </p:txBody>
       </p:sp>
@@ -6802,7 +6792,6 @@
               <a:rPr lang="en-US" dirty="0" smtClean="0"/>
               <a:t>Make sure you save before continuing</a:t>
             </a:r>
-            <a:endParaRPr lang="en-US" dirty="0" smtClean="0"/>
           </a:p>
         </p:txBody>
       </p:sp>
@@ -6941,7 +6930,6 @@
               <a:rPr lang="en-US" dirty="0" smtClean="0"/>
               <a:t>Just click OK on the next prompt</a:t>
             </a:r>
-            <a:endParaRPr lang="en-US" dirty="0" smtClean="0"/>
           </a:p>
         </p:txBody>
       </p:sp>
@@ -7475,7 +7463,6 @@
               <a:rPr lang="en-US" altLang="x-none" dirty="0" smtClean="0"/>
               <a:t> repository do the following:</a:t>
             </a:r>
-            <a:endParaRPr lang="en-US" altLang="x-none" dirty="0" smtClean="0"/>
           </a:p>
           <a:p>
             <a:pPr marL="274320" lvl="1"/>
@@ -7483,7 +7470,6 @@
               <a:rPr lang="en-US" altLang="x-none" dirty="0" smtClean="0"/>
               <a:t>Click the plus sign and select create new repository</a:t>
             </a:r>
-            <a:endParaRPr lang="en-US" altLang="x-none" dirty="0" smtClean="0"/>
           </a:p>
           <a:p>
             <a:pPr marL="274320" lvl="1"/>

</xml_diff>